<commit_message>
Atualizados sem o atualizado do yuri :(
</commit_message>
<xml_diff>
--- a/APRESENTAÇÃO/Sprint 1 ATUALIZADO 1 [Salvo automaticamente].pptx
+++ b/APRESENTAÇÃO/Sprint 1 ATUALIZADO 1 [Salvo automaticamente].pptx
@@ -7538,6 +7538,7 @@
       <p:sp>
         <p:nvSpPr>
           <p:cNvPr id="2" name="Retângulo: Cantos Arredondados 1">
+            <a:hlinkClick r:id="rId3" action="ppaction://hlinkfile"/>
             <a:extLst>
               <a:ext uri="{FF2B5EF4-FFF2-40B4-BE49-F238E27FC236}">
                 <a16:creationId xmlns:a16="http://schemas.microsoft.com/office/drawing/2014/main" id="{3C1CAF08-13B9-48BA-A271-8CE5B568A664}"/>
@@ -7597,46 +7598,10 @@
       <p:pic>
         <p:nvPicPr>
           <p:cNvPr id="21" name="Imagem 20" descr="Uma imagem contendo brinquedo, lego, relógio&#10;&#10;Descrição gerada automaticamente">
-            <a:hlinkClick r:id="rId3" action="ppaction://hlinksldjump"/>
+            <a:hlinkClick r:id="rId4" action="ppaction://hlinksldjump"/>
             <a:extLst>
               <a:ext uri="{FF2B5EF4-FFF2-40B4-BE49-F238E27FC236}">
                 <a16:creationId xmlns:a16="http://schemas.microsoft.com/office/drawing/2014/main" id="{4965E1D3-0FC1-4744-A8F4-8AF42AC5C028}"/>
-              </a:ext>
-            </a:extLst>
-          </p:cNvPr>
-          <p:cNvPicPr>
-            <a:picLocks noChangeAspect="1"/>
-          </p:cNvPicPr>
-          <p:nvPr/>
-        </p:nvPicPr>
-        <p:blipFill>
-          <a:blip r:embed="rId4">
-            <a:extLst>
-              <a:ext uri="{28A0092B-C50C-407E-A947-70E740481C1C}">
-                <a14:useLocalDpi xmlns:a14="http://schemas.microsoft.com/office/drawing/2010/main" val="0"/>
-              </a:ext>
-            </a:extLst>
-          </a:blip>
-          <a:stretch>
-            <a:fillRect/>
-          </a:stretch>
-        </p:blipFill>
-        <p:spPr>
-          <a:xfrm>
-            <a:off x="11066616" y="6107744"/>
-            <a:ext cx="1125384" cy="750256"/>
-          </a:xfrm>
-          <a:prstGeom prst="rect">
-            <a:avLst/>
-          </a:prstGeom>
-        </p:spPr>
-      </p:pic>
-      <p:pic>
-        <p:nvPicPr>
-          <p:cNvPr id="5" name="Imagem 4" descr="Tela preta com letras brancas&#10;&#10;Descrição gerada automaticamente">
-            <a:extLst>
-              <a:ext uri="{FF2B5EF4-FFF2-40B4-BE49-F238E27FC236}">
-                <a16:creationId xmlns:a16="http://schemas.microsoft.com/office/drawing/2014/main" id="{E74DCA59-C5B2-41C9-BDD7-9DDE86AD165D}"/>
               </a:ext>
             </a:extLst>
           </p:cNvPr>
@@ -7647,6 +7612,43 @@
         </p:nvPicPr>
         <p:blipFill>
           <a:blip r:embed="rId5">
+            <a:extLst>
+              <a:ext uri="{28A0092B-C50C-407E-A947-70E740481C1C}">
+                <a14:useLocalDpi xmlns:a14="http://schemas.microsoft.com/office/drawing/2010/main" val="0"/>
+              </a:ext>
+            </a:extLst>
+          </a:blip>
+          <a:stretch>
+            <a:fillRect/>
+          </a:stretch>
+        </p:blipFill>
+        <p:spPr>
+          <a:xfrm>
+            <a:off x="11066616" y="6107744"/>
+            <a:ext cx="1125384" cy="750256"/>
+          </a:xfrm>
+          <a:prstGeom prst="rect">
+            <a:avLst/>
+          </a:prstGeom>
+        </p:spPr>
+      </p:pic>
+      <p:pic>
+        <p:nvPicPr>
+          <p:cNvPr id="5" name="Imagem 4" descr="Tela preta com letras brancas&#10;&#10;Descrição gerada automaticamente">
+            <a:hlinkClick r:id="rId3" action="ppaction://hlinkfile"/>
+            <a:extLst>
+              <a:ext uri="{FF2B5EF4-FFF2-40B4-BE49-F238E27FC236}">
+                <a16:creationId xmlns:a16="http://schemas.microsoft.com/office/drawing/2014/main" id="{E74DCA59-C5B2-41C9-BDD7-9DDE86AD165D}"/>
+              </a:ext>
+            </a:extLst>
+          </p:cNvPr>
+          <p:cNvPicPr>
+            <a:picLocks noChangeAspect="1"/>
+          </p:cNvPicPr>
+          <p:nvPr/>
+        </p:nvPicPr>
+        <p:blipFill>
+          <a:blip r:embed="rId6">
             <a:extLst>
               <a:ext uri="{28A0092B-C50C-407E-A947-70E740481C1C}">
                 <a14:useLocalDpi xmlns:a14="http://schemas.microsoft.com/office/drawing/2010/main" val="0"/>
@@ -8404,11 +8406,11 @@
       </p:pic>
       <p:pic>
         <p:nvPicPr>
-          <p:cNvPr id="5" name="Imagem 4" descr="Tela de celular com texto preto sobre fundo branco&#10;&#10;Descrição gerada automaticamente">
+          <p:cNvPr id="4" name="Imagem 3" descr="Uma imagem contendo screenshot, texto&#10;&#10;Descrição gerada automaticamente">
             <a:hlinkClick r:id="rId3" action="ppaction://hlinkfile"/>
             <a:extLst>
               <a:ext uri="{FF2B5EF4-FFF2-40B4-BE49-F238E27FC236}">
-                <a16:creationId xmlns:a16="http://schemas.microsoft.com/office/drawing/2014/main" id="{9FFC1D32-51B2-4243-975D-D0521CA758A2}"/>
+                <a16:creationId xmlns:a16="http://schemas.microsoft.com/office/drawing/2014/main" id="{6988296E-2A6C-441F-AE16-CE5CD8DD40A5}"/>
               </a:ext>
             </a:extLst>
           </p:cNvPr>
@@ -8431,8 +8433,8 @@
         </p:blipFill>
         <p:spPr>
           <a:xfrm>
-            <a:off x="2637182" y="2068170"/>
-            <a:ext cx="6538122" cy="5018769"/>
+            <a:off x="1877485" y="2198959"/>
+            <a:ext cx="9221236" cy="6002140"/>
           </a:xfrm>
           <a:prstGeom prst="rect">
             <a:avLst/>
@@ -10206,7 +10208,7 @@
         </p:nvSpPr>
         <p:spPr>
           <a:xfrm>
-            <a:off x="940904" y="2398643"/>
+            <a:off x="1157494" y="2611543"/>
             <a:ext cx="5857461" cy="923330"/>
           </a:xfrm>
           <a:prstGeom prst="rect">

</xml_diff>

<commit_message>
atualizado por yuri oq a milene nao conseguiu
</commit_message>
<xml_diff>
--- a/APRESENTAÇÃO/Sprint 1 ATUALIZADO 1 [Salvo automaticamente].pptx
+++ b/APRESENTAÇÃO/Sprint 1 ATUALIZADO 1 [Salvo automaticamente].pptx
@@ -9779,6 +9779,96 @@
           </a:p>
         </p:txBody>
       </p:sp>
+      <p:sp>
+        <p:nvSpPr>
+          <p:cNvPr id="5" name="CaixaDeTexto 4">
+            <a:extLst>
+              <a:ext uri="{FF2B5EF4-FFF2-40B4-BE49-F238E27FC236}">
+                <a16:creationId xmlns:a16="http://schemas.microsoft.com/office/drawing/2014/main" id="{C988F6C2-DC7F-4073-9B2A-AC7A9011F07E}"/>
+              </a:ext>
+            </a:extLst>
+          </p:cNvPr>
+          <p:cNvSpPr txBox="1"/>
+          <p:nvPr/>
+        </p:nvSpPr>
+        <p:spPr>
+          <a:xfrm>
+            <a:off x="1060621" y="6214449"/>
+            <a:ext cx="10070757" cy="369332"/>
+          </a:xfrm>
+          <a:prstGeom prst="rect">
+            <a:avLst/>
+          </a:prstGeom>
+          <a:noFill/>
+        </p:spPr>
+        <p:txBody>
+          <a:bodyPr wrap="square" rtlCol="0">
+            <a:spAutoFit/>
+          </a:bodyPr>
+          <a:lstStyle/>
+          <a:p>
+            <a:r>
+              <a:rPr lang="pt-BR" dirty="0">
+                <a:solidFill>
+                  <a:schemeClr val="accent5"/>
+                </a:solidFill>
+                <a:hlinkClick r:id="rId5">
+                  <a:extLst>
+                    <a:ext uri="{A12FA001-AC4F-418D-AE19-62706E023703}">
+                      <ahyp:hlinkClr xmlns:ahyp="http://schemas.microsoft.com/office/drawing/2018/hyperlinkcolor" val="tx"/>
+                    </a:ext>
+                  </a:extLst>
+                </a:hlinkClick>
+              </a:rPr>
+              <a:t>https://exame.abril.com.br/economia/energia-passa-a-ser-2a-maior-despesa-de-supermercados/</a:t>
+            </a:r>
+            <a:endParaRPr lang="pt-BR" dirty="0">
+              <a:solidFill>
+                <a:schemeClr val="accent5"/>
+              </a:solidFill>
+            </a:endParaRPr>
+          </a:p>
+        </p:txBody>
+      </p:sp>
+      <p:pic>
+        <p:nvPicPr>
+          <p:cNvPr id="9" name="Gráfico 8" descr="Dedo indicador apontando para a direita">
+            <a:extLst>
+              <a:ext uri="{FF2B5EF4-FFF2-40B4-BE49-F238E27FC236}">
+                <a16:creationId xmlns:a16="http://schemas.microsoft.com/office/drawing/2014/main" id="{E97F040F-52D4-499A-BF39-47B674E46D54}"/>
+              </a:ext>
+            </a:extLst>
+          </p:cNvPr>
+          <p:cNvPicPr>
+            <a:picLocks noChangeAspect="1"/>
+          </p:cNvPicPr>
+          <p:nvPr/>
+        </p:nvPicPr>
+        <p:blipFill>
+          <a:blip r:embed="rId6">
+            <a:extLst>
+              <a:ext uri="{28A0092B-C50C-407E-A947-70E740481C1C}">
+                <a14:useLocalDpi xmlns:a14="http://schemas.microsoft.com/office/drawing/2010/main" val="0"/>
+              </a:ext>
+              <a:ext uri="{96DAC541-7B7A-43D3-8B79-37D633B846F1}">
+                <asvg:svgBlip xmlns:asvg="http://schemas.microsoft.com/office/drawing/2016/SVG/main" r:embed="rId7"/>
+              </a:ext>
+            </a:extLst>
+          </a:blip>
+          <a:stretch>
+            <a:fillRect/>
+          </a:stretch>
+        </p:blipFill>
+        <p:spPr>
+          <a:xfrm>
+            <a:off x="270274" y="6120041"/>
+            <a:ext cx="725585" cy="725585"/>
+          </a:xfrm>
+          <a:prstGeom prst="rect">
+            <a:avLst/>
+          </a:prstGeom>
+        </p:spPr>
+      </p:pic>
     </p:spTree>
     <p:extLst>
       <p:ext uri="{BB962C8B-B14F-4D97-AF65-F5344CB8AC3E}">
@@ -10206,7 +10296,7 @@
         </p:nvSpPr>
         <p:spPr>
           <a:xfrm>
-            <a:off x="940904" y="2398643"/>
+            <a:off x="940904" y="2505670"/>
             <a:ext cx="5857461" cy="923330"/>
           </a:xfrm>
           <a:prstGeom prst="rect">
@@ -10226,7 +10316,7 @@
             </a:pPr>
             <a:r>
               <a:rPr lang="pt-BR" b="1" dirty="0"/>
-              <a:t>40% gasto de forma desnecessária </a:t>
+              <a:t>40% gasto são com iluminação </a:t>
             </a:r>
           </a:p>
           <a:p>
@@ -10237,17 +10327,99 @@
             <a:endParaRPr lang="pt-BR" b="1" dirty="0"/>
           </a:p>
           <a:p>
-            <a:pPr marL="285750" indent="-285750">
-              <a:buFont typeface="Arial" panose="020B0604020202020204" pitchFamily="34" charset="0"/>
-              <a:buChar char="•"/>
-            </a:pPr>
-            <a:r>
-              <a:rPr lang="pt-BR" b="1" dirty="0"/>
-              <a:t>24% é destinada a luminosidade </a:t>
-            </a:r>
-          </a:p>
-        </p:txBody>
-      </p:sp>
+            <a:endParaRPr lang="pt-BR" b="1" dirty="0"/>
+          </a:p>
+        </p:txBody>
+      </p:sp>
+      <p:sp>
+        <p:nvSpPr>
+          <p:cNvPr id="5" name="Retângulo 4">
+            <a:extLst>
+              <a:ext uri="{FF2B5EF4-FFF2-40B4-BE49-F238E27FC236}">
+                <a16:creationId xmlns:a16="http://schemas.microsoft.com/office/drawing/2014/main" id="{85AD5950-6C29-4D6D-936D-4189538D4B8B}"/>
+              </a:ext>
+            </a:extLst>
+          </p:cNvPr>
+          <p:cNvSpPr/>
+          <p:nvPr/>
+        </p:nvSpPr>
+        <p:spPr>
+          <a:xfrm>
+            <a:off x="940904" y="6227473"/>
+            <a:ext cx="9852455" cy="369332"/>
+          </a:xfrm>
+          <a:prstGeom prst="rect">
+            <a:avLst/>
+          </a:prstGeom>
+        </p:spPr>
+        <p:txBody>
+          <a:bodyPr wrap="square">
+            <a:spAutoFit/>
+          </a:bodyPr>
+          <a:lstStyle/>
+          <a:p>
+            <a:r>
+              <a:rPr lang="pt-BR" dirty="0">
+                <a:solidFill>
+                  <a:schemeClr val="accent5"/>
+                </a:solidFill>
+                <a:hlinkClick r:id="rId5">
+                  <a:extLst>
+                    <a:ext uri="{A12FA001-AC4F-418D-AE19-62706E023703}">
+                      <ahyp:hlinkClr xmlns:ahyp="http://schemas.microsoft.com/office/drawing/2018/hyperlinkcolor" val="tx"/>
+                    </a:ext>
+                  </a:extLst>
+                </a:hlinkClick>
+              </a:rPr>
+              <a:t>https://exame.abril.com.br/economia/energia-passa-a-ser-2a-maior-despesa-de-supermercados/</a:t>
+            </a:r>
+            <a:endParaRPr lang="pt-BR" dirty="0">
+              <a:solidFill>
+                <a:schemeClr val="accent5"/>
+              </a:solidFill>
+            </a:endParaRPr>
+          </a:p>
+        </p:txBody>
+      </p:sp>
+      <p:pic>
+        <p:nvPicPr>
+          <p:cNvPr id="12" name="Gráfico 11" descr="Dedo indicador apontando para a direita">
+            <a:extLst>
+              <a:ext uri="{FF2B5EF4-FFF2-40B4-BE49-F238E27FC236}">
+                <a16:creationId xmlns:a16="http://schemas.microsoft.com/office/drawing/2014/main" id="{CCA9093A-26B2-4165-A0CC-3CEF0DE9EE6A}"/>
+              </a:ext>
+            </a:extLst>
+          </p:cNvPr>
+          <p:cNvPicPr>
+            <a:picLocks noChangeAspect="1"/>
+          </p:cNvPicPr>
+          <p:nvPr/>
+        </p:nvPicPr>
+        <p:blipFill>
+          <a:blip r:embed="rId6">
+            <a:extLst>
+              <a:ext uri="{28A0092B-C50C-407E-A947-70E740481C1C}">
+                <a14:useLocalDpi xmlns:a14="http://schemas.microsoft.com/office/drawing/2010/main" val="0"/>
+              </a:ext>
+              <a:ext uri="{96DAC541-7B7A-43D3-8B79-37D633B846F1}">
+                <asvg:svgBlip xmlns:asvg="http://schemas.microsoft.com/office/drawing/2016/SVG/main" r:embed="rId7"/>
+              </a:ext>
+            </a:extLst>
+          </a:blip>
+          <a:stretch>
+            <a:fillRect/>
+          </a:stretch>
+        </p:blipFill>
+        <p:spPr>
+          <a:xfrm>
+            <a:off x="270274" y="6120041"/>
+            <a:ext cx="725585" cy="725585"/>
+          </a:xfrm>
+          <a:prstGeom prst="rect">
+            <a:avLst/>
+          </a:prstGeom>
+        </p:spPr>
+      </p:pic>
     </p:spTree>
     <p:extLst>
       <p:ext uri="{BB962C8B-B14F-4D97-AF65-F5344CB8AC3E}">
@@ -11946,6 +12118,95 @@
           </a:prstGeom>
         </p:spPr>
       </p:pic>
+      <p:pic>
+        <p:nvPicPr>
+          <p:cNvPr id="10" name="Gráfico 9" descr="Dedo indicador apontando para a direita">
+            <a:extLst>
+              <a:ext uri="{FF2B5EF4-FFF2-40B4-BE49-F238E27FC236}">
+                <a16:creationId xmlns:a16="http://schemas.microsoft.com/office/drawing/2014/main" id="{96097265-992F-4F0C-8CA7-000EB60F3AB2}"/>
+              </a:ext>
+            </a:extLst>
+          </p:cNvPr>
+          <p:cNvPicPr>
+            <a:picLocks noChangeAspect="1"/>
+          </p:cNvPicPr>
+          <p:nvPr/>
+        </p:nvPicPr>
+        <p:blipFill>
+          <a:blip r:embed="rId7">
+            <a:extLst>
+              <a:ext uri="{28A0092B-C50C-407E-A947-70E740481C1C}">
+                <a14:useLocalDpi xmlns:a14="http://schemas.microsoft.com/office/drawing/2010/main" val="0"/>
+              </a:ext>
+              <a:ext uri="{96DAC541-7B7A-43D3-8B79-37D633B846F1}">
+                <asvg:svgBlip xmlns:asvg="http://schemas.microsoft.com/office/drawing/2016/SVG/main" r:embed="rId8"/>
+              </a:ext>
+            </a:extLst>
+          </a:blip>
+          <a:stretch>
+            <a:fillRect/>
+          </a:stretch>
+        </p:blipFill>
+        <p:spPr>
+          <a:xfrm>
+            <a:off x="270274" y="6120041"/>
+            <a:ext cx="725585" cy="725585"/>
+          </a:xfrm>
+          <a:prstGeom prst="rect">
+            <a:avLst/>
+          </a:prstGeom>
+        </p:spPr>
+      </p:pic>
+      <p:sp>
+        <p:nvSpPr>
+          <p:cNvPr id="3" name="Retângulo 2">
+            <a:extLst>
+              <a:ext uri="{FF2B5EF4-FFF2-40B4-BE49-F238E27FC236}">
+                <a16:creationId xmlns:a16="http://schemas.microsoft.com/office/drawing/2014/main" id="{7009FCC0-D42A-4377-8384-9AE6471D39DC}"/>
+              </a:ext>
+            </a:extLst>
+          </p:cNvPr>
+          <p:cNvSpPr/>
+          <p:nvPr/>
+        </p:nvSpPr>
+        <p:spPr>
+          <a:xfrm>
+            <a:off x="895176" y="6217733"/>
+            <a:ext cx="5038815" cy="369332"/>
+          </a:xfrm>
+          <a:prstGeom prst="rect">
+            <a:avLst/>
+          </a:prstGeom>
+        </p:spPr>
+        <p:txBody>
+          <a:bodyPr wrap="none">
+            <a:spAutoFit/>
+          </a:bodyPr>
+          <a:lstStyle/>
+          <a:p>
+            <a:r>
+              <a:rPr lang="pt-BR" dirty="0">
+                <a:solidFill>
+                  <a:schemeClr val="accent5"/>
+                </a:solidFill>
+                <a:hlinkClick r:id="rId9">
+                  <a:extLst>
+                    <a:ext uri="{A12FA001-AC4F-418D-AE19-62706E023703}">
+                      <ahyp:hlinkClr xmlns:ahyp="http://schemas.microsoft.com/office/drawing/2018/hyperlinkcolor" val="tx"/>
+                    </a:ext>
+                  </a:extLst>
+                </a:hlinkClick>
+              </a:rPr>
+              <a:t>https://www.chatron.pt/pt/tubo-solar/tubo-solar-2</a:t>
+            </a:r>
+            <a:endParaRPr lang="pt-BR" dirty="0">
+              <a:solidFill>
+                <a:schemeClr val="accent5"/>
+              </a:solidFill>
+            </a:endParaRPr>
+          </a:p>
+        </p:txBody>
+      </p:sp>
     </p:spTree>
     <p:extLst>
       <p:ext uri="{BB962C8B-B14F-4D97-AF65-F5344CB8AC3E}">

</xml_diff>

<commit_message>
Coloquei no slide a parte do HTML
</commit_message>
<xml_diff>
--- a/APRESENTAÇÃO/Sprint 1 ATUALIZADO 1 [Salvo automaticamente].pptx
+++ b/APRESENTAÇÃO/Sprint 1 ATUALIZADO 1 [Salvo automaticamente].pptx
@@ -7549,7 +7549,7 @@
         </p:nvSpPr>
         <p:spPr>
           <a:xfrm>
-            <a:off x="3612243" y="1279692"/>
+            <a:off x="3612243" y="855296"/>
             <a:ext cx="4967514" cy="664797"/>
           </a:xfrm>
           <a:prstGeom prst="roundRect">
@@ -7659,8 +7659,44 @@
         </p:blipFill>
         <p:spPr>
           <a:xfrm>
-            <a:off x="340778" y="2368884"/>
-            <a:ext cx="11510444" cy="2835906"/>
+            <a:off x="540611" y="4074137"/>
+            <a:ext cx="10526005" cy="2593363"/>
+          </a:xfrm>
+          <a:prstGeom prst="rect">
+            <a:avLst/>
+          </a:prstGeom>
+        </p:spPr>
+      </p:pic>
+      <p:pic>
+        <p:nvPicPr>
+          <p:cNvPr id="4" name="Imagem 3">
+            <a:extLst>
+              <a:ext uri="{FF2B5EF4-FFF2-40B4-BE49-F238E27FC236}">
+                <a16:creationId xmlns:a16="http://schemas.microsoft.com/office/drawing/2014/main" id="{A2F4AC96-814C-466A-A009-A8A0FFC540C5}"/>
+              </a:ext>
+            </a:extLst>
+          </p:cNvPr>
+          <p:cNvPicPr>
+            <a:picLocks noChangeAspect="1"/>
+          </p:cNvPicPr>
+          <p:nvPr/>
+        </p:nvPicPr>
+        <p:blipFill>
+          <a:blip r:embed="rId6">
+            <a:extLst>
+              <a:ext uri="{28A0092B-C50C-407E-A947-70E740481C1C}">
+                <a14:useLocalDpi xmlns:a14="http://schemas.microsoft.com/office/drawing/2010/main" val="0"/>
+              </a:ext>
+            </a:extLst>
+          </a:blip>
+          <a:stretch>
+            <a:fillRect/>
+          </a:stretch>
+        </p:blipFill>
+        <p:spPr>
+          <a:xfrm>
+            <a:off x="540611" y="1739727"/>
+            <a:ext cx="10526005" cy="2143910"/>
           </a:xfrm>
           <a:prstGeom prst="rect">
             <a:avLst/>

</xml_diff>

<commit_message>
Mudei os slides pois a foto da programação do arduino estava errada
</commit_message>
<xml_diff>
--- a/APRESENTAÇÃO/Sprint 1 ATUALIZADO 1 [Salvo automaticamente].pptx
+++ b/APRESENTAÇÃO/Sprint 1 ATUALIZADO 1 [Salvo automaticamente].pptx
@@ -7538,6 +7538,7 @@
       <p:sp>
         <p:nvSpPr>
           <p:cNvPr id="2" name="Retângulo: Cantos Arredondados 1">
+            <a:hlinkClick r:id="rId3" action="ppaction://hlinkfile"/>
             <a:extLst>
               <a:ext uri="{FF2B5EF4-FFF2-40B4-BE49-F238E27FC236}">
                 <a16:creationId xmlns:a16="http://schemas.microsoft.com/office/drawing/2014/main" id="{3C1CAF08-13B9-48BA-A271-8CE5B568A664}"/>
@@ -7597,46 +7598,10 @@
       <p:pic>
         <p:nvPicPr>
           <p:cNvPr id="21" name="Imagem 20" descr="Uma imagem contendo brinquedo, lego, relógio&#10;&#10;Descrição gerada automaticamente">
-            <a:hlinkClick r:id="rId3" action="ppaction://hlinksldjump"/>
+            <a:hlinkClick r:id="rId4" action="ppaction://hlinksldjump"/>
             <a:extLst>
               <a:ext uri="{FF2B5EF4-FFF2-40B4-BE49-F238E27FC236}">
                 <a16:creationId xmlns:a16="http://schemas.microsoft.com/office/drawing/2014/main" id="{4965E1D3-0FC1-4744-A8F4-8AF42AC5C028}"/>
-              </a:ext>
-            </a:extLst>
-          </p:cNvPr>
-          <p:cNvPicPr>
-            <a:picLocks noChangeAspect="1"/>
-          </p:cNvPicPr>
-          <p:nvPr/>
-        </p:nvPicPr>
-        <p:blipFill>
-          <a:blip r:embed="rId4">
-            <a:extLst>
-              <a:ext uri="{28A0092B-C50C-407E-A947-70E740481C1C}">
-                <a14:useLocalDpi xmlns:a14="http://schemas.microsoft.com/office/drawing/2010/main" val="0"/>
-              </a:ext>
-            </a:extLst>
-          </a:blip>
-          <a:stretch>
-            <a:fillRect/>
-          </a:stretch>
-        </p:blipFill>
-        <p:spPr>
-          <a:xfrm>
-            <a:off x="11066616" y="6107744"/>
-            <a:ext cx="1125384" cy="750256"/>
-          </a:xfrm>
-          <a:prstGeom prst="rect">
-            <a:avLst/>
-          </a:prstGeom>
-        </p:spPr>
-      </p:pic>
-      <p:pic>
-        <p:nvPicPr>
-          <p:cNvPr id="5" name="Imagem 4" descr="Tela preta com letras brancas&#10;&#10;Descrição gerada automaticamente">
-            <a:extLst>
-              <a:ext uri="{FF2B5EF4-FFF2-40B4-BE49-F238E27FC236}">
-                <a16:creationId xmlns:a16="http://schemas.microsoft.com/office/drawing/2014/main" id="{E74DCA59-C5B2-41C9-BDD7-9DDE86AD165D}"/>
               </a:ext>
             </a:extLst>
           </p:cNvPr>
@@ -7659,8 +7624,8 @@
         </p:blipFill>
         <p:spPr>
           <a:xfrm>
-            <a:off x="540611" y="4074137"/>
-            <a:ext cx="10526005" cy="2593363"/>
+            <a:off x="11066616" y="6107744"/>
+            <a:ext cx="1125384" cy="750256"/>
           </a:xfrm>
           <a:prstGeom prst="rect">
             <a:avLst/>
@@ -7669,10 +7634,11 @@
       </p:pic>
       <p:pic>
         <p:nvPicPr>
-          <p:cNvPr id="4" name="Imagem 3">
-            <a:extLst>
-              <a:ext uri="{FF2B5EF4-FFF2-40B4-BE49-F238E27FC236}">
-                <a16:creationId xmlns:a16="http://schemas.microsoft.com/office/drawing/2014/main" id="{A2F4AC96-814C-466A-A009-A8A0FFC540C5}"/>
+          <p:cNvPr id="5" name="Imagem 4" descr="Tela preta com letras brancas&#10;&#10;Descrição gerada automaticamente">
+            <a:hlinkClick r:id="rId3" action="ppaction://hlinkfile"/>
+            <a:extLst>
+              <a:ext uri="{FF2B5EF4-FFF2-40B4-BE49-F238E27FC236}">
+                <a16:creationId xmlns:a16="http://schemas.microsoft.com/office/drawing/2014/main" id="{E74DCA59-C5B2-41C9-BDD7-9DDE86AD165D}"/>
               </a:ext>
             </a:extLst>
           </p:cNvPr>
@@ -7683,6 +7649,43 @@
         </p:nvPicPr>
         <p:blipFill>
           <a:blip r:embed="rId6">
+            <a:extLst>
+              <a:ext uri="{28A0092B-C50C-407E-A947-70E740481C1C}">
+                <a14:useLocalDpi xmlns:a14="http://schemas.microsoft.com/office/drawing/2010/main" val="0"/>
+              </a:ext>
+            </a:extLst>
+          </a:blip>
+          <a:stretch>
+            <a:fillRect/>
+          </a:stretch>
+        </p:blipFill>
+        <p:spPr>
+          <a:xfrm>
+            <a:off x="540611" y="4074137"/>
+            <a:ext cx="10526005" cy="2593363"/>
+          </a:xfrm>
+          <a:prstGeom prst="rect">
+            <a:avLst/>
+          </a:prstGeom>
+        </p:spPr>
+      </p:pic>
+      <p:pic>
+        <p:nvPicPr>
+          <p:cNvPr id="4" name="Imagem 3">
+            <a:hlinkClick r:id="rId3" action="ppaction://hlinkfile"/>
+            <a:extLst>
+              <a:ext uri="{FF2B5EF4-FFF2-40B4-BE49-F238E27FC236}">
+                <a16:creationId xmlns:a16="http://schemas.microsoft.com/office/drawing/2014/main" id="{A2F4AC96-814C-466A-A009-A8A0FFC540C5}"/>
+              </a:ext>
+            </a:extLst>
+          </p:cNvPr>
+          <p:cNvPicPr>
+            <a:picLocks noChangeAspect="1"/>
+          </p:cNvPicPr>
+          <p:nvPr/>
+        </p:nvPicPr>
+        <p:blipFill>
+          <a:blip r:embed="rId7">
             <a:extLst>
               <a:ext uri="{28A0092B-C50C-407E-A947-70E740481C1C}">
                 <a14:useLocalDpi xmlns:a14="http://schemas.microsoft.com/office/drawing/2010/main" val="0"/>
@@ -8440,11 +8443,11 @@
       </p:pic>
       <p:pic>
         <p:nvPicPr>
-          <p:cNvPr id="5" name="Imagem 4" descr="Tela de celular com texto preto sobre fundo branco&#10;&#10;Descrição gerada automaticamente">
+          <p:cNvPr id="9" name="Imagem 8" descr="Uma imagem contendo screenshot, texto&#10;&#10;Descrição gerada automaticamente">
             <a:hlinkClick r:id="rId3" action="ppaction://hlinkfile"/>
             <a:extLst>
               <a:ext uri="{FF2B5EF4-FFF2-40B4-BE49-F238E27FC236}">
-                <a16:creationId xmlns:a16="http://schemas.microsoft.com/office/drawing/2014/main" id="{9FFC1D32-51B2-4243-975D-D0521CA758A2}"/>
+                <a16:creationId xmlns:a16="http://schemas.microsoft.com/office/drawing/2014/main" id="{140980E5-63ED-417D-8979-B99F2F41E941}"/>
               </a:ext>
             </a:extLst>
           </p:cNvPr>
@@ -8467,8 +8470,8 @@
         </p:blipFill>
         <p:spPr>
           <a:xfrm>
-            <a:off x="2637182" y="2068170"/>
-            <a:ext cx="6538122" cy="5018769"/>
+            <a:off x="1886619" y="2173609"/>
+            <a:ext cx="8418761" cy="5479805"/>
           </a:xfrm>
           <a:prstGeom prst="rect">
             <a:avLst/>
@@ -10820,7 +10823,7 @@
         <p:spPr>
           <a:xfrm>
             <a:off x="940903" y="2796209"/>
-            <a:ext cx="8772939" cy="3262432"/>
+            <a:ext cx="8772939" cy="2431435"/>
           </a:xfrm>
           <a:prstGeom prst="rect">
             <a:avLst/>
@@ -10850,37 +10853,6 @@
             <a:endParaRPr lang="pt-BR" sz="2400" b="1" dirty="0"/>
           </a:p>
           <a:p>
-            <a:pPr marL="285750" indent="-285750">
-              <a:buFont typeface="Arial" panose="020B0604020202020204" pitchFamily="34" charset="0"/>
-              <a:buChar char="•"/>
-            </a:pPr>
-            <a:r>
-              <a:rPr lang="pt-BR" b="1" dirty="0"/>
-              <a:t>Empresa EVA.</a:t>
-            </a:r>
-          </a:p>
-          <a:p>
-            <a:pPr marL="285750" indent="-285750">
-              <a:buFont typeface="Arial" panose="020B0604020202020204" pitchFamily="34" charset="0"/>
-              <a:buChar char="•"/>
-            </a:pPr>
-            <a:endParaRPr lang="pt-BR" b="1" dirty="0"/>
-          </a:p>
-          <a:p>
-            <a:pPr marL="285750" indent="-285750">
-              <a:buFont typeface="Arial" panose="020B0604020202020204" pitchFamily="34" charset="0"/>
-              <a:buChar char="•"/>
-            </a:pPr>
-            <a:r>
-              <a:rPr lang="pt-BR" b="1" dirty="0"/>
-              <a:t>Que tem como seu principal objetivo a economia de energia elétrica.</a:t>
-            </a:r>
-          </a:p>
-          <a:p>
-            <a:pPr marL="285750" indent="-285750">
-              <a:buFont typeface="Arial" panose="020B0604020202020204" pitchFamily="34" charset="0"/>
-              <a:buChar char="•"/>
-            </a:pPr>
             <a:endParaRPr lang="pt-BR" sz="2400" b="1" dirty="0"/>
           </a:p>
           <a:p>

</xml_diff>

<commit_message>
modificação do slide do arduino
</commit_message>
<xml_diff>
--- a/APRESENTAÇÃO/Sprint 1 ATUALIZADO 1 [Salvo automaticamente].pptx
+++ b/APRESENTAÇÃO/Sprint 1 ATUALIZADO 1 [Salvo automaticamente].pptx
@@ -8471,8 +8471,48 @@
         </p:blipFill>
         <p:spPr>
           <a:xfrm>
-            <a:off x="1886619" y="2173609"/>
+            <a:off x="730876" y="2173609"/>
             <a:ext cx="8418761" cy="5479805"/>
+          </a:xfrm>
+          <a:prstGeom prst="rect">
+            <a:avLst/>
+          </a:prstGeom>
+        </p:spPr>
+      </p:pic>
+      <p:pic>
+        <p:nvPicPr>
+          <p:cNvPr id="6" name="Imagem 5">
+            <a:hlinkClick r:id="rId7"/>
+            <a:extLst>
+              <a:ext uri="{FF2B5EF4-FFF2-40B4-BE49-F238E27FC236}">
+                <a16:creationId xmlns:a16="http://schemas.microsoft.com/office/drawing/2014/main" id="{68AF11D7-67E0-4F5C-9611-F7EC0AF51E09}"/>
+              </a:ext>
+            </a:extLst>
+          </p:cNvPr>
+          <p:cNvPicPr>
+            <a:picLocks noChangeAspect="1"/>
+          </p:cNvPicPr>
+          <p:nvPr/>
+        </p:nvPicPr>
+        <p:blipFill>
+          <a:blip r:embed="rId8">
+            <a:extLst>
+              <a:ext uri="{28A0092B-C50C-407E-A947-70E740481C1C}">
+                <a14:useLocalDpi xmlns:a14="http://schemas.microsoft.com/office/drawing/2010/main" val="0"/>
+              </a:ext>
+              <a:ext uri="{837473B0-CC2E-450A-ABE3-18F120FF3D39}">
+                <a1611:picAttrSrcUrl xmlns:a1611="http://schemas.microsoft.com/office/drawing/2016/11/main" r:id="rId9"/>
+              </a:ext>
+            </a:extLst>
+          </a:blip>
+          <a:stretch>
+            <a:fillRect/>
+          </a:stretch>
+        </p:blipFill>
+        <p:spPr>
+          <a:xfrm>
+            <a:off x="7800455" y="2219692"/>
+            <a:ext cx="4113068" cy="3619500"/>
           </a:xfrm>
           <a:prstGeom prst="rect">
             <a:avLst/>
@@ -8842,7 +8882,7 @@
         <p:spPr>
           <a:xfrm>
             <a:off x="2043112" y="2188859"/>
-            <a:ext cx="4267200" cy="2585323"/>
+            <a:ext cx="4267200" cy="2031325"/>
           </a:xfrm>
           <a:prstGeom prst="rect">
             <a:avLst/>
@@ -8890,7 +8930,7 @@
             </a:r>
             <a:r>
               <a:rPr lang="pt-BR" b="1" dirty="0"/>
-              <a:t> clone = cola arquivo </a:t>
+              <a:t> clone</a:t>
             </a:r>
           </a:p>
           <a:p>
@@ -8919,7 +8959,7 @@
             </a:r>
             <a:r>
               <a:rPr lang="pt-BR" b="1" dirty="0"/>
-              <a:t> = pega arquivo</a:t>
+              <a:t> </a:t>
             </a:r>
           </a:p>
           <a:p>
@@ -8935,26 +8975,13 @@
               <a:buChar char="•"/>
             </a:pPr>
             <a:r>
-              <a:rPr lang="pt-BR" b="1" dirty="0"/>
-              <a:t> </a:t>
-            </a:r>
-            <a:r>
               <a:rPr lang="pt-BR" b="1" dirty="0" err="1"/>
               <a:t>Git</a:t>
             </a:r>
             <a:r>
               <a:rPr lang="pt-BR" b="1" dirty="0"/>
-              <a:t> status = vê se tem alguma</a:t>
-            </a:r>
-          </a:p>
-          <a:p>
-            <a:r>
-              <a:rPr lang="pt-BR" b="1" dirty="0"/>
-              <a:t>     alteração </a:t>
-            </a:r>
-          </a:p>
-          <a:p>
-            <a:endParaRPr lang="pt-BR" b="1" dirty="0"/>
+              <a:t> status</a:t>
+            </a:r>
           </a:p>
         </p:txBody>
       </p:sp>
@@ -8972,7 +8999,7 @@
         </p:nvSpPr>
         <p:spPr>
           <a:xfrm>
-            <a:off x="6096000" y="2378881"/>
+            <a:off x="6096000" y="2690336"/>
             <a:ext cx="4784035" cy="1477328"/>
           </a:xfrm>
           <a:prstGeom prst="rect">
@@ -9004,7 +9031,7 @@
             </a:r>
             <a:r>
               <a:rPr lang="pt-BR" b="1" dirty="0"/>
-              <a:t> . = adiciona aos alterados</a:t>
+              <a:t> . </a:t>
             </a:r>
           </a:p>
           <a:p>
@@ -9065,7 +9092,7 @@
             </a:r>
             <a:r>
               <a:rPr lang="pt-BR" b="1" dirty="0"/>
-              <a:t> = envia os arquivos atualizados</a:t>
+              <a:t> </a:t>
             </a:r>
           </a:p>
         </p:txBody>

</xml_diff>